<commit_message>
Bolded URLs in sequence diagram
</commit_message>
<xml_diff>
--- a/docs/diagrams/AuthenticationSequenceDiagram.pptx
+++ b/docs/diagrams/AuthenticationSequenceDiagram.pptx
@@ -4946,7 +4946,7 @@
         <p:spPr>
           <a:xfrm>
             <a:off x="5540549" y="2270193"/>
-            <a:ext cx="2047939" cy="400110"/>
+            <a:ext cx="2079451" cy="400110"/>
           </a:xfrm>
           <a:prstGeom prst="rect">
             <a:avLst/>
@@ -4977,7 +4977,16 @@
                 </a:solidFill>
                 <a:cs typeface="Arial" panose="020B0604020202020204" pitchFamily="34" charset="0"/>
               </a:rPr>
-              <a:t>Navigate to authentication URL*</a:t>
+              <a:t>Navigate to </a:t>
+            </a:r>
+            <a:r>
+              <a:rPr lang="en-SG" sz="1000" b="1">
+                <a:solidFill>
+                  <a:prstClr val="black"/>
+                </a:solidFill>
+                <a:cs typeface="Arial" panose="020B0604020202020204" pitchFamily="34" charset="0"/>
+              </a:rPr>
+              <a:t>authentication URL*</a:t>
             </a:r>
           </a:p>
           <a:p>
@@ -4992,7 +5001,16 @@
                 </a:solidFill>
                 <a:cs typeface="Arial" panose="020B0604020202020204" pitchFamily="34" charset="0"/>
               </a:rPr>
-              <a:t>Scans for success URL*</a:t>
+              <a:t>Scans for </a:t>
+            </a:r>
+            <a:r>
+              <a:rPr lang="en-SG" sz="1000" b="1">
+                <a:solidFill>
+                  <a:prstClr val="black"/>
+                </a:solidFill>
+                <a:cs typeface="Arial" panose="020B0604020202020204" pitchFamily="34" charset="0"/>
+              </a:rPr>
+              <a:t>success URL*</a:t>
             </a:r>
           </a:p>
         </p:txBody>

</xml_diff>